<commit_message>
useCase5 geupdate en design patterns adapter presentatie ook
</commit_message>
<xml_diff>
--- a/src/main/resources/Design Patterns/Adapter (1).pptx
+++ b/src/main/resources/Design Patterns/Adapter (1).pptx
@@ -975,7 +975,7 @@
           <a:p>
             <a:fld id="{C2B61ADA-2BE5-4866-A7C6-3A82B11EB040}" type="datetimeFigureOut">
               <a:rPr lang="nl-NL" smtClean="0"/>
-              <a:t>16-1-2022</a:t>
+              <a:t>17-1-2022</a:t>
             </a:fld>
             <a:endParaRPr lang="nl-NL"/>
           </a:p>
@@ -1175,7 +1175,7 @@
           <a:p>
             <a:fld id="{C2B61ADA-2BE5-4866-A7C6-3A82B11EB040}" type="datetimeFigureOut">
               <a:rPr lang="nl-NL" smtClean="0"/>
-              <a:t>16-1-2022</a:t>
+              <a:t>17-1-2022</a:t>
             </a:fld>
             <a:endParaRPr lang="nl-NL"/>
           </a:p>
@@ -1385,7 +1385,7 @@
           <a:p>
             <a:fld id="{C2B61ADA-2BE5-4866-A7C6-3A82B11EB040}" type="datetimeFigureOut">
               <a:rPr lang="nl-NL" smtClean="0"/>
-              <a:t>16-1-2022</a:t>
+              <a:t>17-1-2022</a:t>
             </a:fld>
             <a:endParaRPr lang="nl-NL"/>
           </a:p>
@@ -1585,7 +1585,7 @@
           <a:p>
             <a:fld id="{C2B61ADA-2BE5-4866-A7C6-3A82B11EB040}" type="datetimeFigureOut">
               <a:rPr lang="nl-NL" smtClean="0"/>
-              <a:t>16-1-2022</a:t>
+              <a:t>17-1-2022</a:t>
             </a:fld>
             <a:endParaRPr lang="nl-NL"/>
           </a:p>
@@ -1861,7 +1861,7 @@
           <a:p>
             <a:fld id="{C2B61ADA-2BE5-4866-A7C6-3A82B11EB040}" type="datetimeFigureOut">
               <a:rPr lang="nl-NL" smtClean="0"/>
-              <a:t>16-1-2022</a:t>
+              <a:t>17-1-2022</a:t>
             </a:fld>
             <a:endParaRPr lang="nl-NL"/>
           </a:p>
@@ -2129,7 +2129,7 @@
           <a:p>
             <a:fld id="{C2B61ADA-2BE5-4866-A7C6-3A82B11EB040}" type="datetimeFigureOut">
               <a:rPr lang="nl-NL" smtClean="0"/>
-              <a:t>16-1-2022</a:t>
+              <a:t>17-1-2022</a:t>
             </a:fld>
             <a:endParaRPr lang="nl-NL"/>
           </a:p>
@@ -2544,7 +2544,7 @@
           <a:p>
             <a:fld id="{C2B61ADA-2BE5-4866-A7C6-3A82B11EB040}" type="datetimeFigureOut">
               <a:rPr lang="nl-NL" smtClean="0"/>
-              <a:t>16-1-2022</a:t>
+              <a:t>17-1-2022</a:t>
             </a:fld>
             <a:endParaRPr lang="nl-NL"/>
           </a:p>
@@ -2686,7 +2686,7 @@
           <a:p>
             <a:fld id="{C2B61ADA-2BE5-4866-A7C6-3A82B11EB040}" type="datetimeFigureOut">
               <a:rPr lang="nl-NL" smtClean="0"/>
-              <a:t>16-1-2022</a:t>
+              <a:t>17-1-2022</a:t>
             </a:fld>
             <a:endParaRPr lang="nl-NL"/>
           </a:p>
@@ -2799,7 +2799,7 @@
           <a:p>
             <a:fld id="{C2B61ADA-2BE5-4866-A7C6-3A82B11EB040}" type="datetimeFigureOut">
               <a:rPr lang="nl-NL" smtClean="0"/>
-              <a:t>16-1-2022</a:t>
+              <a:t>17-1-2022</a:t>
             </a:fld>
             <a:endParaRPr lang="nl-NL"/>
           </a:p>
@@ -3112,7 +3112,7 @@
           <a:p>
             <a:fld id="{C2B61ADA-2BE5-4866-A7C6-3A82B11EB040}" type="datetimeFigureOut">
               <a:rPr lang="nl-NL" smtClean="0"/>
-              <a:t>16-1-2022</a:t>
+              <a:t>17-1-2022</a:t>
             </a:fld>
             <a:endParaRPr lang="nl-NL"/>
           </a:p>
@@ -3401,7 +3401,7 @@
           <a:p>
             <a:fld id="{C2B61ADA-2BE5-4866-A7C6-3A82B11EB040}" type="datetimeFigureOut">
               <a:rPr lang="nl-NL" smtClean="0"/>
-              <a:t>16-1-2022</a:t>
+              <a:t>17-1-2022</a:t>
             </a:fld>
             <a:endParaRPr lang="nl-NL"/>
           </a:p>
@@ -3644,7 +3644,7 @@
           <a:p>
             <a:fld id="{C2B61ADA-2BE5-4866-A7C6-3A82B11EB040}" type="datetimeFigureOut">
               <a:rPr lang="nl-NL" smtClean="0"/>
-              <a:t>16-1-2022</a:t>
+              <a:t>17-1-2022</a:t>
             </a:fld>
             <a:endParaRPr lang="nl-NL"/>
           </a:p>
@@ -4899,7 +4899,7 @@
               </a:rPr>
               <a:t>.</a:t>
             </a:r>
-            <a:endParaRPr lang="en-GB"/>
+            <a:endParaRPr lang="en-GB" dirty="0"/>
           </a:p>
           <a:p>
             <a:endParaRPr lang="en-GB" dirty="0">
@@ -5214,7 +5214,7 @@
                 <a:effectLst/>
                 <a:latin typeface="PT Sans" panose="020B0503020203020204" pitchFamily="34" charset="0"/>
               </a:rPr>
-              <a:t>houd</a:t>
+              <a:t>houdt</a:t>
             </a:r>
             <a:r>
               <a:rPr lang="en-US" b="0" i="0" dirty="0">
@@ -5680,6 +5680,33 @@
               <a:t>worden</a:t>
             </a:r>
             <a:r>
+              <a:rPr lang="en-US" dirty="0">
+                <a:solidFill>
+                  <a:srgbClr val="444444"/>
+                </a:solidFill>
+                <a:latin typeface="PT Sans" panose="020B0503020203020204" pitchFamily="34" charset="0"/>
+              </a:rPr>
+              <a:t> </a:t>
+            </a:r>
+            <a:r>
+              <a:rPr lang="en-US" dirty="0" err="1">
+                <a:solidFill>
+                  <a:srgbClr val="444444"/>
+                </a:solidFill>
+                <a:latin typeface="PT Sans" panose="020B0503020203020204" pitchFamily="34" charset="0"/>
+              </a:rPr>
+              <a:t>wanneer</a:t>
+            </a:r>
+            <a:r>
+              <a:rPr lang="en-US" dirty="0">
+                <a:solidFill>
+                  <a:srgbClr val="444444"/>
+                </a:solidFill>
+                <a:latin typeface="PT Sans" panose="020B0503020203020204" pitchFamily="34" charset="0"/>
+              </a:rPr>
+              <a:t> </a:t>
+            </a:r>
+            <a:r>
               <a:rPr lang="en-US" b="0" i="0" dirty="0">
                 <a:solidFill>
                   <a:srgbClr val="444444"/>
@@ -5687,26 +5714,7 @@
                 <a:effectLst/>
                 <a:latin typeface="PT Sans" panose="020B0503020203020204" pitchFamily="34" charset="0"/>
               </a:rPr>
-              <a:t>. </a:t>
-            </a:r>
-            <a:r>
-              <a:rPr lang="en-US" dirty="0">
-                <a:solidFill>
-                  <a:srgbClr val="444444"/>
-                </a:solidFill>
-                <a:latin typeface="PT Sans" panose="020B0503020203020204" pitchFamily="34" charset="0"/>
-              </a:rPr>
-              <a:t>A</a:t>
-            </a:r>
-            <a:r>
-              <a:rPr lang="en-US" b="0" i="0" dirty="0">
-                <a:solidFill>
-                  <a:srgbClr val="444444"/>
-                </a:solidFill>
-                <a:effectLst/>
-                <a:latin typeface="PT Sans" panose="020B0503020203020204" pitchFamily="34" charset="0"/>
-              </a:rPr>
-              <a:t>ls je </a:t>
+              <a:t>je </a:t>
             </a:r>
             <a:r>
               <a:rPr lang="en-US" b="0" i="0" dirty="0" err="1">
@@ -6730,7 +6738,7 @@
             <a:pPr marL="0" indent="0">
               <a:buNone/>
             </a:pPr>
-            <a:endParaRPr lang="en-US" sz="2400" b="0" i="0">
+            <a:endParaRPr lang="en-US" sz="2400" b="0" i="0" dirty="0">
               <a:effectLst/>
             </a:endParaRPr>
           </a:p>
@@ -6739,16 +6747,204 @@
               <a:buNone/>
             </a:pPr>
             <a:r>
-              <a:rPr lang="en-US" sz="2400" b="0" i="0">
+              <a:rPr lang="en-US" sz="2400" b="0" i="0" dirty="0" err="1">
                 <a:effectLst/>
               </a:rPr>
               <a:t>Som</a:t>
             </a:r>
             <a:r>
-              <a:rPr lang="en-US" sz="2400"/>
-              <a:t>s wil je je code niet compleet aanpassen om een bepaald component aan je code toe te voegen dat niet aansluit op de interface die gebruikt wordt door de client. Dit komt bijvoorbeeld voor wanneer je in verouderde software een nieuwe library wilt gebruiken.</a:t>
-            </a:r>
-            <a:endParaRPr lang="en-US" sz="2400">
+              <a:rPr lang="en-US" sz="2400" dirty="0" err="1"/>
+              <a:t>s</a:t>
+            </a:r>
+            <a:r>
+              <a:rPr lang="en-US" sz="2400" dirty="0"/>
+              <a:t> </a:t>
+            </a:r>
+            <a:r>
+              <a:rPr lang="en-US" sz="2400" dirty="0" err="1"/>
+              <a:t>wil</a:t>
+            </a:r>
+            <a:r>
+              <a:rPr lang="en-US" sz="2400" dirty="0"/>
+              <a:t> je </a:t>
+            </a:r>
+            <a:r>
+              <a:rPr lang="en-US" sz="2400" dirty="0" err="1"/>
+              <a:t>je</a:t>
+            </a:r>
+            <a:r>
+              <a:rPr lang="en-US" sz="2400" dirty="0"/>
+              <a:t> code </a:t>
+            </a:r>
+            <a:r>
+              <a:rPr lang="en-US" sz="2400" dirty="0" err="1"/>
+              <a:t>niet</a:t>
+            </a:r>
+            <a:r>
+              <a:rPr lang="en-US" sz="2400" dirty="0"/>
+              <a:t> </a:t>
+            </a:r>
+            <a:r>
+              <a:rPr lang="en-US" sz="2400" dirty="0" err="1"/>
+              <a:t>compleet</a:t>
+            </a:r>
+            <a:r>
+              <a:rPr lang="en-US" sz="2400" dirty="0"/>
+              <a:t> </a:t>
+            </a:r>
+            <a:r>
+              <a:rPr lang="en-US" sz="2400" dirty="0" err="1"/>
+              <a:t>aanpassen</a:t>
+            </a:r>
+            <a:r>
+              <a:rPr lang="en-US" sz="2400" dirty="0"/>
+              <a:t> om </a:t>
+            </a:r>
+            <a:r>
+              <a:rPr lang="en-US" sz="2400" dirty="0" err="1"/>
+              <a:t>een</a:t>
+            </a:r>
+            <a:r>
+              <a:rPr lang="en-US" sz="2400" dirty="0"/>
+              <a:t> </a:t>
+            </a:r>
+            <a:r>
+              <a:rPr lang="en-US" sz="2400" dirty="0" err="1"/>
+              <a:t>bepaald</a:t>
+            </a:r>
+            <a:r>
+              <a:rPr lang="en-US" sz="2400" dirty="0"/>
+              <a:t> component </a:t>
+            </a:r>
+            <a:r>
+              <a:rPr lang="en-US" sz="2400" dirty="0" err="1"/>
+              <a:t>aan</a:t>
+            </a:r>
+            <a:r>
+              <a:rPr lang="en-US" sz="2400" dirty="0"/>
+              <a:t> je code toe </a:t>
+            </a:r>
+            <a:r>
+              <a:rPr lang="en-US" sz="2400" dirty="0" err="1"/>
+              <a:t>te</a:t>
+            </a:r>
+            <a:r>
+              <a:rPr lang="en-US" sz="2400" dirty="0"/>
+              <a:t> </a:t>
+            </a:r>
+            <a:r>
+              <a:rPr lang="en-US" sz="2400" dirty="0" err="1"/>
+              <a:t>voegen</a:t>
+            </a:r>
+            <a:r>
+              <a:rPr lang="en-US" sz="2400" dirty="0"/>
+              <a:t> die </a:t>
+            </a:r>
+            <a:r>
+              <a:rPr lang="en-US" sz="2400" dirty="0" err="1"/>
+              <a:t>niet</a:t>
+            </a:r>
+            <a:r>
+              <a:rPr lang="en-US" sz="2400" dirty="0"/>
+              <a:t> </a:t>
+            </a:r>
+            <a:r>
+              <a:rPr lang="en-US" sz="2400" dirty="0" err="1"/>
+              <a:t>aansluit</a:t>
+            </a:r>
+            <a:r>
+              <a:rPr lang="en-US" sz="2400" dirty="0"/>
+              <a:t> op de interface die </a:t>
+            </a:r>
+            <a:r>
+              <a:rPr lang="en-US" sz="2400" dirty="0" err="1"/>
+              <a:t>gebruikt</a:t>
+            </a:r>
+            <a:r>
+              <a:rPr lang="en-US" sz="2400" dirty="0"/>
+              <a:t> </a:t>
+            </a:r>
+            <a:r>
+              <a:rPr lang="en-US" sz="2400" dirty="0" err="1"/>
+              <a:t>wordt</a:t>
+            </a:r>
+            <a:r>
+              <a:rPr lang="en-US" sz="2400" dirty="0"/>
+              <a:t> door de client. </a:t>
+            </a:r>
+            <a:r>
+              <a:rPr lang="en-US" sz="2400" dirty="0" err="1"/>
+              <a:t>Dit</a:t>
+            </a:r>
+            <a:r>
+              <a:rPr lang="en-US" sz="2400" dirty="0"/>
+              <a:t> </a:t>
+            </a:r>
+            <a:r>
+              <a:rPr lang="en-US" sz="2400" dirty="0" err="1"/>
+              <a:t>komt</a:t>
+            </a:r>
+            <a:r>
+              <a:rPr lang="en-US" sz="2400" dirty="0"/>
+              <a:t> </a:t>
+            </a:r>
+            <a:r>
+              <a:rPr lang="en-US" sz="2400" dirty="0" err="1"/>
+              <a:t>bijvoorbeeld</a:t>
+            </a:r>
+            <a:r>
+              <a:rPr lang="en-US" sz="2400" dirty="0"/>
+              <a:t> </a:t>
+            </a:r>
+            <a:r>
+              <a:rPr lang="en-US" sz="2400" dirty="0" err="1"/>
+              <a:t>voor</a:t>
+            </a:r>
+            <a:r>
+              <a:rPr lang="en-US" sz="2400" dirty="0"/>
+              <a:t> </a:t>
+            </a:r>
+            <a:r>
+              <a:rPr lang="en-US" sz="2400" dirty="0" err="1"/>
+              <a:t>wanneer</a:t>
+            </a:r>
+            <a:r>
+              <a:rPr lang="en-US" sz="2400" dirty="0"/>
+              <a:t> je in </a:t>
+            </a:r>
+            <a:r>
+              <a:rPr lang="en-US" sz="2400" dirty="0" err="1"/>
+              <a:t>verouderde</a:t>
+            </a:r>
+            <a:r>
+              <a:rPr lang="en-US" sz="2400" dirty="0"/>
+              <a:t> software </a:t>
+            </a:r>
+            <a:r>
+              <a:rPr lang="en-US" sz="2400" dirty="0" err="1"/>
+              <a:t>een</a:t>
+            </a:r>
+            <a:r>
+              <a:rPr lang="en-US" sz="2400" dirty="0"/>
+              <a:t> </a:t>
+            </a:r>
+            <a:r>
+              <a:rPr lang="en-US" sz="2400" dirty="0" err="1"/>
+              <a:t>nieuwe</a:t>
+            </a:r>
+            <a:r>
+              <a:rPr lang="en-US" sz="2400" dirty="0"/>
+              <a:t> library wilt </a:t>
+            </a:r>
+            <a:r>
+              <a:rPr lang="en-US" sz="2400" dirty="0" err="1"/>
+              <a:t>gebruiken</a:t>
+            </a:r>
+            <a:r>
+              <a:rPr lang="en-US" sz="2400" dirty="0"/>
+              <a:t>.</a:t>
+            </a:r>
+            <a:endParaRPr lang="en-US" sz="2400" dirty="0">
               <a:cs typeface="Calibri"/>
             </a:endParaRPr>
           </a:p>
@@ -8223,18 +8419,18 @@
 </file>
 
 <file path=customXml/item1.xml><?xml version="1.0" encoding="utf-8"?>
-<p:properties xmlns:p="http://schemas.microsoft.com/office/2006/metadata/properties" xmlns:xsi="http://www.w3.org/2001/XMLSchema-instance" xmlns:pc="http://schemas.microsoft.com/office/infopath/2007/PartnerControls">
-  <documentManagement/>
-</p:properties>
-</file>
-
-<file path=customXml/item2.xml><?xml version="1.0" encoding="utf-8"?>
 <?mso-contentType ?>
 <FormTemplates xmlns="http://schemas.microsoft.com/sharepoint/v3/contenttype/forms">
   <Display>DocumentLibraryForm</Display>
   <Edit>DocumentLibraryForm</Edit>
   <New>DocumentLibraryForm</New>
 </FormTemplates>
+</file>
+
+<file path=customXml/item2.xml><?xml version="1.0" encoding="utf-8"?>
+<p:properties xmlns:p="http://schemas.microsoft.com/office/2006/metadata/properties" xmlns:xsi="http://www.w3.org/2001/XMLSchema-instance" xmlns:pc="http://schemas.microsoft.com/office/infopath/2007/PartnerControls">
+  <documentManagement/>
+</p:properties>
 </file>
 
 <file path=customXml/item3.xml><?xml version="1.0" encoding="utf-8"?>
@@ -8409,6 +8605,14 @@
 </file>
 
 <file path=customXml/itemProps1.xml><?xml version="1.0" encoding="utf-8"?>
+<ds:datastoreItem xmlns:ds="http://schemas.openxmlformats.org/officeDocument/2006/customXml" ds:itemID="{1FC461B3-262C-4D3E-9278-A4F05B134060}">
+  <ds:schemaRefs>
+    <ds:schemaRef ds:uri="http://schemas.microsoft.com/sharepoint/v3/contenttype/forms"/>
+  </ds:schemaRefs>
+</ds:datastoreItem>
+</file>
+
+<file path=customXml/itemProps2.xml><?xml version="1.0" encoding="utf-8"?>
 <ds:datastoreItem xmlns:ds="http://schemas.openxmlformats.org/officeDocument/2006/customXml" ds:itemID="{AE8BD14A-1E35-4A72-B420-C3DAD90C569B}">
   <ds:schemaRefs>
     <ds:schemaRef ds:uri="http://schemas.microsoft.com/office/infopath/2007/PartnerControls"/>
@@ -8421,14 +8625,6 @@
     <ds:schemaRef ds:uri="http://schemas.openxmlformats.org/package/2006/metadata/core-properties"/>
     <ds:schemaRef ds:uri="779b990f-5743-43ad-82d1-e09dee374f9e"/>
     <ds:schemaRef ds:uri="http://www.w3.org/XML/1998/namespace"/>
-  </ds:schemaRefs>
-</ds:datastoreItem>
-</file>
-
-<file path=customXml/itemProps2.xml><?xml version="1.0" encoding="utf-8"?>
-<ds:datastoreItem xmlns:ds="http://schemas.openxmlformats.org/officeDocument/2006/customXml" ds:itemID="{1FC461B3-262C-4D3E-9278-A4F05B134060}">
-  <ds:schemaRefs>
-    <ds:schemaRef ds:uri="http://schemas.microsoft.com/sharepoint/v3/contenttype/forms"/>
   </ds:schemaRefs>
 </ds:datastoreItem>
 </file>

</xml_diff>